<commit_message>
add business model slide
</commit_message>
<xml_diff>
--- a/presentation/softuniada/presentation.pptx
+++ b/presentation/softuniada/presentation.pptx
@@ -8,8 +8,8 @@
     <p:sldId id="256" r:id="rId2"/>
     <p:sldId id="257" r:id="rId3"/>
     <p:sldId id="258" r:id="rId4"/>
-    <p:sldId id="259" r:id="rId5"/>
-    <p:sldId id="260" r:id="rId6"/>
+    <p:sldId id="260" r:id="rId5"/>
+    <p:sldId id="259" r:id="rId6"/>
   </p:sldIdLst>
   <p:sldSz cx="12192000" cy="6858000"/>
   <p:notesSz cx="6858000" cy="9144000"/>
@@ -3858,6 +3858,33 @@
           <a:p>
             <a:pPr lvl="1"/>
             <a:r>
+              <a:rPr lang="en-GB" sz="2800" b="1" dirty="0">
+                <a:solidFill>
+                  <a:schemeClr val="tx1">
+                    <a:lumMod val="75000"/>
+                    <a:lumOff val="25000"/>
+                  </a:schemeClr>
+                </a:solidFill>
+                <a:latin typeface="Nunito" panose="00000500000000000000" pitchFamily="2" charset="0"/>
+              </a:rPr>
+              <a:t>- Subscription based platform</a:t>
+            </a:r>
+          </a:p>
+          <a:p>
+            <a:pPr lvl="1"/>
+            <a:endParaRPr lang="en-GB" sz="2800" b="1" dirty="0">
+              <a:solidFill>
+                <a:schemeClr val="tx1">
+                  <a:lumMod val="75000"/>
+                  <a:lumOff val="25000"/>
+                </a:schemeClr>
+              </a:solidFill>
+              <a:latin typeface="Nunito" panose="00000500000000000000" pitchFamily="2" charset="0"/>
+            </a:endParaRPr>
+          </a:p>
+          <a:p>
+            <a:pPr lvl="1"/>
+            <a:r>
               <a:rPr lang="en-GB" sz="2800" b="1" dirty="0" smtClean="0">
                 <a:solidFill>
                   <a:schemeClr val="tx1">
@@ -3867,8 +3894,68 @@
                 </a:solidFill>
                 <a:latin typeface="Nunito" panose="00000500000000000000" pitchFamily="2" charset="0"/>
               </a:rPr>
-              <a:t>- Fast, responsive and beautiful web app</a:t>
-            </a:r>
+              <a:t>- </a:t>
+            </a:r>
+            <a:r>
+              <a:rPr lang="en-GB" sz="2800" b="1" dirty="0" smtClean="0">
+                <a:solidFill>
+                  <a:schemeClr val="tx1">
+                    <a:lumMod val="75000"/>
+                    <a:lumOff val="25000"/>
+                  </a:schemeClr>
+                </a:solidFill>
+                <a:latin typeface="Nunito" panose="00000500000000000000" pitchFamily="2" charset="0"/>
+              </a:rPr>
+              <a:t>Fast, responsive and beautiful web app</a:t>
+            </a:r>
+          </a:p>
+          <a:p>
+            <a:pPr lvl="1"/>
+            <a:endParaRPr lang="en-GB" sz="2800" b="1" dirty="0">
+              <a:solidFill>
+                <a:schemeClr val="tx1">
+                  <a:lumMod val="75000"/>
+                  <a:lumOff val="25000"/>
+                </a:schemeClr>
+              </a:solidFill>
+              <a:latin typeface="Nunito" panose="00000500000000000000" pitchFamily="2" charset="0"/>
+            </a:endParaRPr>
+          </a:p>
+          <a:p>
+            <a:pPr lvl="1"/>
+            <a:r>
+              <a:rPr lang="en-GB" sz="2800" b="1" dirty="0" smtClean="0">
+                <a:solidFill>
+                  <a:schemeClr val="tx1">
+                    <a:lumMod val="75000"/>
+                    <a:lumOff val="25000"/>
+                  </a:schemeClr>
+                </a:solidFill>
+                <a:latin typeface="Nunito" panose="00000500000000000000" pitchFamily="2" charset="0"/>
+              </a:rPr>
+              <a:t>- No registrations </a:t>
+            </a:r>
+            <a:r>
+              <a:rPr lang="en-GB" sz="2800" b="1" dirty="0" smtClean="0">
+                <a:solidFill>
+                  <a:schemeClr val="tx1">
+                    <a:lumMod val="75000"/>
+                    <a:lumOff val="25000"/>
+                  </a:schemeClr>
+                </a:solidFill>
+                <a:latin typeface="Nunito" panose="00000500000000000000" pitchFamily="2" charset="0"/>
+              </a:rPr>
+              <a:t>required</a:t>
+            </a:r>
+            <a:endParaRPr lang="en-GB" sz="2800" b="1" dirty="0">
+              <a:solidFill>
+                <a:schemeClr val="tx1">
+                  <a:lumMod val="75000"/>
+                  <a:lumOff val="25000"/>
+                </a:schemeClr>
+              </a:solidFill>
+              <a:latin typeface="Nunito" panose="00000500000000000000" pitchFamily="2" charset="0"/>
+            </a:endParaRPr>
           </a:p>
           <a:p>
             <a:pPr lvl="1"/>
@@ -3894,7 +3981,7 @@
                 </a:solidFill>
                 <a:latin typeface="Nunito" panose="00000500000000000000" pitchFamily="2" charset="0"/>
               </a:rPr>
-              <a:t>- Quickly order the food that you desire</a:t>
+              <a:t>- Use on any device</a:t>
             </a:r>
             <a:endParaRPr lang="en-GB" sz="2800" b="1" dirty="0">
               <a:solidFill>
@@ -3906,104 +3993,8 @@
               <a:latin typeface="Nunito" panose="00000500000000000000" pitchFamily="2" charset="0"/>
             </a:endParaRPr>
           </a:p>
-          <a:p>
-            <a:pPr lvl="1"/>
-            <a:endParaRPr lang="en-GB" sz="2800" b="1" dirty="0">
-              <a:solidFill>
-                <a:schemeClr val="tx1">
-                  <a:lumMod val="75000"/>
-                  <a:lumOff val="25000"/>
-                </a:schemeClr>
-              </a:solidFill>
-              <a:latin typeface="Nunito" panose="00000500000000000000" pitchFamily="2" charset="0"/>
-            </a:endParaRPr>
-          </a:p>
-          <a:p>
-            <a:pPr lvl="1"/>
-            <a:r>
-              <a:rPr lang="en-GB" sz="2800" b="1" dirty="0" smtClean="0">
-                <a:solidFill>
-                  <a:schemeClr val="tx1">
-                    <a:lumMod val="75000"/>
-                    <a:lumOff val="25000"/>
-                  </a:schemeClr>
-                </a:solidFill>
-                <a:latin typeface="Nunito" panose="00000500000000000000" pitchFamily="2" charset="0"/>
-              </a:rPr>
-              <a:t>- No registrations required</a:t>
-            </a:r>
-          </a:p>
-          <a:p>
-            <a:pPr marL="914400" lvl="1" indent="-457200">
-              <a:buFontTx/>
-              <a:buChar char="-"/>
-            </a:pPr>
-            <a:endParaRPr lang="en-GB" sz="2800" b="1" dirty="0" smtClean="0">
-              <a:solidFill>
-                <a:schemeClr val="tx1">
-                  <a:lumMod val="75000"/>
-                  <a:lumOff val="25000"/>
-                </a:schemeClr>
-              </a:solidFill>
-              <a:latin typeface="Nunito" panose="00000500000000000000" pitchFamily="2" charset="0"/>
-            </a:endParaRPr>
-          </a:p>
-          <a:p>
-            <a:pPr lvl="1"/>
-            <a:r>
-              <a:rPr lang="en-GB" sz="2800" b="1" dirty="0" smtClean="0">
-                <a:solidFill>
-                  <a:schemeClr val="tx1">
-                    <a:lumMod val="75000"/>
-                    <a:lumOff val="25000"/>
-                  </a:schemeClr>
-                </a:solidFill>
-                <a:latin typeface="Nunito" panose="00000500000000000000" pitchFamily="2" charset="0"/>
-              </a:rPr>
-              <a:t>- Use on any device</a:t>
-            </a:r>
-            <a:endParaRPr lang="en-GB" sz="2800" b="1" dirty="0">
-              <a:solidFill>
-                <a:schemeClr val="tx1">
-                  <a:lumMod val="75000"/>
-                  <a:lumOff val="25000"/>
-                </a:schemeClr>
-              </a:solidFill>
-              <a:latin typeface="Nunito" panose="00000500000000000000" pitchFamily="2" charset="0"/>
-            </a:endParaRPr>
-          </a:p>
-        </p:txBody>
-      </p:sp>
-      <p:pic>
-        <p:nvPicPr>
-          <p:cNvPr id="6" name="Picture 5"/>
-          <p:cNvPicPr>
-            <a:picLocks noChangeAspect="1"/>
-          </p:cNvPicPr>
-          <p:nvPr/>
-        </p:nvPicPr>
-        <p:blipFill>
-          <a:blip r:embed="rId3" cstate="print">
-            <a:extLst>
-              <a:ext uri="{28A0092B-C50C-407E-A947-70E740481C1C}">
-                <a14:useLocalDpi xmlns:a14="http://schemas.microsoft.com/office/drawing/2010/main" val="0"/>
-              </a:ext>
-            </a:extLst>
-          </a:blip>
-          <a:stretch>
-            <a:fillRect/>
-          </a:stretch>
-        </p:blipFill>
-        <p:spPr>
-          <a:xfrm flipH="1">
-            <a:off x="38100" y="2908300"/>
-            <a:ext cx="6622109" cy="3911600"/>
-          </a:xfrm>
-          <a:prstGeom prst="rect">
-            <a:avLst/>
-          </a:prstGeom>
-        </p:spPr>
-      </p:pic>
+        </p:txBody>
+      </p:sp>
       <p:grpSp>
         <p:nvGrpSpPr>
           <p:cNvPr id="10" name="Group 9"/>
@@ -4027,11 +4018,11 @@
             <p:nvPr/>
           </p:nvPicPr>
           <p:blipFill>
-            <a:blip r:embed="rId4" cstate="print">
+            <a:blip r:embed="rId3" cstate="print">
               <a:extLst>
                 <a:ext uri="{BEBA8EAE-BF5A-486C-A8C5-ECC9F3942E4B}">
                   <a14:imgProps xmlns:a14="http://schemas.microsoft.com/office/drawing/2010/main">
-                    <a14:imgLayer r:embed="rId5">
+                    <a14:imgLayer r:embed="rId4">
                       <a14:imgEffect>
                         <a14:colorTemperature colorTemp="11200"/>
                       </a14:imgEffect>
@@ -4066,7 +4057,7 @@
             <p:nvPr/>
           </p:nvPicPr>
           <p:blipFill>
-            <a:blip r:embed="rId6" cstate="print">
+            <a:blip r:embed="rId5" cstate="print">
               <a:extLst>
                 <a:ext uri="{28A0092B-C50C-407E-A947-70E740481C1C}">
                   <a14:useLocalDpi xmlns:a14="http://schemas.microsoft.com/office/drawing/2010/main" val="0"/>
@@ -4088,6 +4079,96 @@
           </p:spPr>
         </p:pic>
       </p:grpSp>
+      <p:pic>
+        <p:nvPicPr>
+          <p:cNvPr id="11" name="Picture 10"/>
+          <p:cNvPicPr>
+            <a:picLocks noChangeAspect="1"/>
+          </p:cNvPicPr>
+          <p:nvPr/>
+        </p:nvPicPr>
+        <p:blipFill>
+          <a:blip r:embed="rId6" cstate="print">
+            <a:extLst>
+              <a:ext uri="{28A0092B-C50C-407E-A947-70E740481C1C}">
+                <a14:useLocalDpi xmlns:a14="http://schemas.microsoft.com/office/drawing/2010/main" val="0"/>
+              </a:ext>
+            </a:extLst>
+          </a:blip>
+          <a:stretch>
+            <a:fillRect/>
+          </a:stretch>
+        </p:blipFill>
+        <p:spPr>
+          <a:xfrm rot="14442226">
+            <a:off x="-566154" y="538434"/>
+            <a:ext cx="7715971" cy="7715971"/>
+          </a:xfrm>
+          <a:prstGeom prst="rect">
+            <a:avLst/>
+          </a:prstGeom>
+        </p:spPr>
+      </p:pic>
+      <p:pic>
+        <p:nvPicPr>
+          <p:cNvPr id="13" name="Picture 12"/>
+          <p:cNvPicPr>
+            <a:picLocks noChangeAspect="1"/>
+          </p:cNvPicPr>
+          <p:nvPr/>
+        </p:nvPicPr>
+        <p:blipFill>
+          <a:blip r:embed="rId7" cstate="print">
+            <a:extLst>
+              <a:ext uri="{28A0092B-C50C-407E-A947-70E740481C1C}">
+                <a14:useLocalDpi xmlns:a14="http://schemas.microsoft.com/office/drawing/2010/main" val="0"/>
+              </a:ext>
+            </a:extLst>
+          </a:blip>
+          <a:stretch>
+            <a:fillRect/>
+          </a:stretch>
+        </p:blipFill>
+        <p:spPr>
+          <a:xfrm rot="453932">
+            <a:off x="819448" y="2385404"/>
+            <a:ext cx="1986953" cy="3989929"/>
+          </a:xfrm>
+          <a:prstGeom prst="rect">
+            <a:avLst/>
+          </a:prstGeom>
+        </p:spPr>
+      </p:pic>
+      <p:pic>
+        <p:nvPicPr>
+          <p:cNvPr id="14" name="Picture 13"/>
+          <p:cNvPicPr>
+            <a:picLocks noChangeAspect="1"/>
+          </p:cNvPicPr>
+          <p:nvPr/>
+        </p:nvPicPr>
+        <p:blipFill>
+          <a:blip r:embed="rId8" cstate="print">
+            <a:extLst>
+              <a:ext uri="{28A0092B-C50C-407E-A947-70E740481C1C}">
+                <a14:useLocalDpi xmlns:a14="http://schemas.microsoft.com/office/drawing/2010/main" val="0"/>
+              </a:ext>
+            </a:extLst>
+          </a:blip>
+          <a:stretch>
+            <a:fillRect/>
+          </a:stretch>
+        </p:blipFill>
+        <p:spPr>
+          <a:xfrm rot="470453">
+            <a:off x="698667" y="1360432"/>
+            <a:ext cx="6831892" cy="5123919"/>
+          </a:xfrm>
+          <a:prstGeom prst="rect">
+            <a:avLst/>
+          </a:prstGeom>
+        </p:spPr>
+      </p:pic>
     </p:spTree>
     <p:extLst>
       <p:ext uri="{BB962C8B-B14F-4D97-AF65-F5344CB8AC3E}">
@@ -4117,6 +4198,434 @@
 </file>
 
 <file path=ppt/slides/slide4.xml><?xml version="1.0" encoding="utf-8"?>
+<p:sld xmlns:a="http://schemas.openxmlformats.org/drawingml/2006/main" xmlns:r="http://schemas.openxmlformats.org/officeDocument/2006/relationships" xmlns:p="http://schemas.openxmlformats.org/presentationml/2006/main">
+  <p:cSld>
+    <p:bg>
+      <p:bgPr>
+        <a:solidFill>
+          <a:schemeClr val="bg1"/>
+        </a:solidFill>
+        <a:effectLst/>
+      </p:bgPr>
+    </p:bg>
+    <p:spTree>
+      <p:nvGrpSpPr>
+        <p:cNvPr id="1" name=""/>
+        <p:cNvGrpSpPr/>
+        <p:nvPr/>
+      </p:nvGrpSpPr>
+      <p:grpSpPr>
+        <a:xfrm>
+          <a:off x="0" y="0"/>
+          <a:ext cx="0" cy="0"/>
+          <a:chOff x="0" y="0"/>
+          <a:chExt cx="0" cy="0"/>
+        </a:xfrm>
+      </p:grpSpPr>
+      <p:pic>
+        <p:nvPicPr>
+          <p:cNvPr id="20" name="Picture 19"/>
+          <p:cNvPicPr>
+            <a:picLocks noChangeAspect="1"/>
+          </p:cNvPicPr>
+          <p:nvPr/>
+        </p:nvPicPr>
+        <p:blipFill>
+          <a:blip r:embed="rId2" cstate="print">
+            <a:extLst>
+              <a:ext uri="{28A0092B-C50C-407E-A947-70E740481C1C}">
+                <a14:useLocalDpi xmlns:a14="http://schemas.microsoft.com/office/drawing/2010/main" val="0"/>
+              </a:ext>
+            </a:extLst>
+          </a:blip>
+          <a:stretch>
+            <a:fillRect/>
+          </a:stretch>
+        </p:blipFill>
+        <p:spPr>
+          <a:xfrm rot="11346299">
+            <a:off x="8807491" y="2656255"/>
+            <a:ext cx="6769017" cy="6769017"/>
+          </a:xfrm>
+          <a:prstGeom prst="rect">
+            <a:avLst/>
+          </a:prstGeom>
+          <a:noFill/>
+          <a:ln>
+            <a:noFill/>
+          </a:ln>
+        </p:spPr>
+      </p:pic>
+      <p:grpSp>
+        <p:nvGrpSpPr>
+          <p:cNvPr id="10" name="Group 9"/>
+          <p:cNvGrpSpPr/>
+          <p:nvPr/>
+        </p:nvGrpSpPr>
+        <p:grpSpPr>
+          <a:xfrm>
+            <a:off x="-2982265" y="-4038029"/>
+            <a:ext cx="6769017" cy="6769017"/>
+            <a:chOff x="-2982265" y="-4038029"/>
+            <a:chExt cx="6769017" cy="6769017"/>
+          </a:xfrm>
+        </p:grpSpPr>
+        <p:pic>
+          <p:nvPicPr>
+            <p:cNvPr id="17" name="Picture 16"/>
+            <p:cNvPicPr>
+              <a:picLocks noChangeAspect="1"/>
+            </p:cNvPicPr>
+            <p:nvPr/>
+          </p:nvPicPr>
+          <p:blipFill>
+            <a:blip r:embed="rId3" cstate="print">
+              <a:extLst>
+                <a:ext uri="{BEBA8EAE-BF5A-486C-A8C5-ECC9F3942E4B}">
+                  <a14:imgProps xmlns:a14="http://schemas.microsoft.com/office/drawing/2010/main">
+                    <a14:imgLayer r:embed="rId4">
+                      <a14:imgEffect>
+                        <a14:colorTemperature colorTemp="11200"/>
+                      </a14:imgEffect>
+                    </a14:imgLayer>
+                  </a14:imgProps>
+                </a:ext>
+                <a:ext uri="{28A0092B-C50C-407E-A947-70E740481C1C}">
+                  <a14:useLocalDpi xmlns:a14="http://schemas.microsoft.com/office/drawing/2010/main" val="0"/>
+                </a:ext>
+              </a:extLst>
+            </a:blip>
+            <a:stretch>
+              <a:fillRect/>
+            </a:stretch>
+          </p:blipFill>
+          <p:spPr>
+            <a:xfrm rot="8119872">
+              <a:off x="-2982265" y="-4038029"/>
+              <a:ext cx="6769017" cy="6769017"/>
+            </a:xfrm>
+            <a:prstGeom prst="rect">
+              <a:avLst/>
+            </a:prstGeom>
+            <a:ln>
+              <a:noFill/>
+            </a:ln>
+          </p:spPr>
+        </p:pic>
+        <p:pic>
+          <p:nvPicPr>
+            <p:cNvPr id="18" name="Picture 17"/>
+            <p:cNvPicPr>
+              <a:picLocks noChangeAspect="1"/>
+            </p:cNvPicPr>
+            <p:nvPr/>
+          </p:nvPicPr>
+          <p:blipFill>
+            <a:blip r:embed="rId5" cstate="print">
+              <a:extLst>
+                <a:ext uri="{28A0092B-C50C-407E-A947-70E740481C1C}">
+                  <a14:useLocalDpi xmlns:a14="http://schemas.microsoft.com/office/drawing/2010/main" val="0"/>
+                </a:ext>
+              </a:extLst>
+            </a:blip>
+            <a:stretch>
+              <a:fillRect/>
+            </a:stretch>
+          </p:blipFill>
+          <p:spPr>
+            <a:xfrm>
+              <a:off x="-1377" y="178861"/>
+              <a:ext cx="1793583" cy="1793583"/>
+            </a:xfrm>
+            <a:prstGeom prst="rect">
+              <a:avLst/>
+            </a:prstGeom>
+            <a:ln>
+              <a:noFill/>
+            </a:ln>
+          </p:spPr>
+        </p:pic>
+      </p:grpSp>
+      <p:sp>
+        <p:nvSpPr>
+          <p:cNvPr id="19" name="TextBox 18"/>
+          <p:cNvSpPr txBox="1"/>
+          <p:nvPr/>
+        </p:nvSpPr>
+        <p:spPr>
+          <a:xfrm>
+            <a:off x="6687460" y="1782237"/>
+            <a:ext cx="4702628" cy="3970318"/>
+          </a:xfrm>
+          <a:prstGeom prst="rect">
+            <a:avLst/>
+          </a:prstGeom>
+          <a:noFill/>
+        </p:spPr>
+        <p:txBody>
+          <a:bodyPr wrap="square" rtlCol="0">
+            <a:spAutoFit/>
+          </a:bodyPr>
+          <a:lstStyle/>
+          <a:p>
+            <a:pPr lvl="1"/>
+            <a:r>
+              <a:rPr lang="en-GB" sz="2800" b="1" dirty="0" smtClean="0">
+                <a:solidFill>
+                  <a:schemeClr val="tx1">
+                    <a:lumMod val="75000"/>
+                    <a:lumOff val="25000"/>
+                  </a:schemeClr>
+                </a:solidFill>
+                <a:latin typeface="Nunito" panose="00000500000000000000" pitchFamily="2" charset="0"/>
+              </a:rPr>
+              <a:t>- Owners will pay a monthly fee to use the service</a:t>
+            </a:r>
+            <a:endParaRPr lang="en-GB" sz="2800" b="1" dirty="0" smtClean="0">
+              <a:solidFill>
+                <a:schemeClr val="tx1">
+                  <a:lumMod val="75000"/>
+                  <a:lumOff val="25000"/>
+                </a:schemeClr>
+              </a:solidFill>
+              <a:latin typeface="Nunito" panose="00000500000000000000" pitchFamily="2" charset="0"/>
+            </a:endParaRPr>
+          </a:p>
+          <a:p>
+            <a:pPr lvl="1"/>
+            <a:endParaRPr lang="en-GB" sz="2800" b="1" dirty="0">
+              <a:solidFill>
+                <a:schemeClr val="tx1">
+                  <a:lumMod val="75000"/>
+                  <a:lumOff val="25000"/>
+                </a:schemeClr>
+              </a:solidFill>
+              <a:latin typeface="Nunito" panose="00000500000000000000" pitchFamily="2" charset="0"/>
+            </a:endParaRPr>
+          </a:p>
+          <a:p>
+            <a:pPr lvl="1"/>
+            <a:r>
+              <a:rPr lang="en-GB" sz="2800" b="1" dirty="0" smtClean="0">
+                <a:solidFill>
+                  <a:schemeClr val="tx1">
+                    <a:lumMod val="75000"/>
+                    <a:lumOff val="25000"/>
+                  </a:schemeClr>
+                </a:solidFill>
+                <a:latin typeface="Nunito" panose="00000500000000000000" pitchFamily="2" charset="0"/>
+              </a:rPr>
+              <a:t>- They will g</a:t>
+            </a:r>
+            <a:r>
+              <a:rPr lang="en-GB" sz="2800" b="1" dirty="0" smtClean="0">
+                <a:solidFill>
+                  <a:schemeClr val="tx1">
+                    <a:lumMod val="75000"/>
+                    <a:lumOff val="25000"/>
+                  </a:schemeClr>
+                </a:solidFill>
+                <a:latin typeface="Nunito" panose="00000500000000000000" pitchFamily="2" charset="0"/>
+              </a:rPr>
+              <a:t>et</a:t>
+            </a:r>
+            <a:r>
+              <a:rPr lang="en-GB" sz="2800" b="1" dirty="0" smtClean="0">
+                <a:solidFill>
+                  <a:schemeClr val="tx1">
+                    <a:lumMod val="75000"/>
+                    <a:lumOff val="25000"/>
+                  </a:schemeClr>
+                </a:solidFill>
+                <a:latin typeface="Nunito" panose="00000500000000000000" pitchFamily="2" charset="0"/>
+              </a:rPr>
+              <a:t> a fully customized restaurant menu and admin panel</a:t>
+            </a:r>
+            <a:endParaRPr lang="en-GB" sz="2800" b="1" dirty="0">
+              <a:solidFill>
+                <a:schemeClr val="tx1">
+                  <a:lumMod val="75000"/>
+                  <a:lumOff val="25000"/>
+                </a:schemeClr>
+              </a:solidFill>
+              <a:latin typeface="Nunito" panose="00000500000000000000" pitchFamily="2" charset="0"/>
+            </a:endParaRPr>
+          </a:p>
+          <a:p>
+            <a:pPr lvl="1"/>
+            <a:endParaRPr lang="en-GB" sz="2800" b="1" dirty="0">
+              <a:solidFill>
+                <a:schemeClr val="tx1">
+                  <a:lumMod val="75000"/>
+                  <a:lumOff val="25000"/>
+                </a:schemeClr>
+              </a:solidFill>
+              <a:latin typeface="Nunito" panose="00000500000000000000" pitchFamily="2" charset="0"/>
+            </a:endParaRPr>
+          </a:p>
+          <a:p>
+            <a:pPr lvl="1"/>
+            <a:r>
+              <a:rPr lang="en-GB" sz="2800" b="1" dirty="0" smtClean="0">
+                <a:solidFill>
+                  <a:schemeClr val="tx1">
+                    <a:lumMod val="75000"/>
+                    <a:lumOff val="25000"/>
+                  </a:schemeClr>
+                </a:solidFill>
+                <a:latin typeface="Nunito" panose="00000500000000000000" pitchFamily="2" charset="0"/>
+              </a:rPr>
+              <a:t>- No hardware required</a:t>
+            </a:r>
+            <a:endParaRPr lang="en-GB" sz="2800" b="1" dirty="0">
+              <a:solidFill>
+                <a:schemeClr val="tx1">
+                  <a:lumMod val="75000"/>
+                  <a:lumOff val="25000"/>
+                </a:schemeClr>
+              </a:solidFill>
+              <a:latin typeface="Nunito" panose="00000500000000000000" pitchFamily="2" charset="0"/>
+            </a:endParaRPr>
+          </a:p>
+        </p:txBody>
+      </p:sp>
+      <p:sp>
+        <p:nvSpPr>
+          <p:cNvPr id="21" name="Title 1"/>
+          <p:cNvSpPr txBox="1">
+            <a:spLocks/>
+          </p:cNvSpPr>
+          <p:nvPr/>
+        </p:nvSpPr>
+        <p:spPr>
+          <a:xfrm>
+            <a:off x="1524000" y="-844019"/>
+            <a:ext cx="9938658" cy="2387600"/>
+          </a:xfrm>
+          <a:prstGeom prst="rect">
+            <a:avLst/>
+          </a:prstGeom>
+        </p:spPr>
+        <p:txBody>
+          <a:bodyPr vert="horz" lIns="91440" tIns="45720" rIns="91440" bIns="45720" rtlCol="0" anchor="b">
+            <a:normAutofit/>
+          </a:bodyPr>
+          <a:lstStyle>
+            <a:lvl1pPr algn="ctr" defTabSz="914400" rtl="0" eaLnBrk="1" latinLnBrk="0" hangingPunct="1">
+              <a:lnSpc>
+                <a:spcPct val="90000"/>
+              </a:lnSpc>
+              <a:spcBef>
+                <a:spcPct val="0"/>
+              </a:spcBef>
+              <a:buNone/>
+              <a:defRPr sz="6000" kern="1200">
+                <a:solidFill>
+                  <a:schemeClr val="tx1"/>
+                </a:solidFill>
+                <a:latin typeface="+mj-lt"/>
+                <a:ea typeface="+mj-ea"/>
+                <a:cs typeface="+mj-cs"/>
+              </a:defRPr>
+            </a:lvl1pPr>
+          </a:lstStyle>
+          <a:p>
+            <a:pPr algn="r"/>
+            <a:r>
+              <a:rPr lang="en-GB" sz="8800" b="1" dirty="0" smtClean="0">
+                <a:gradFill flip="none" rotWithShape="1">
+                  <a:gsLst>
+                    <a:gs pos="100000">
+                      <a:srgbClr val="EA6984"/>
+                    </a:gs>
+                    <a:gs pos="0">
+                      <a:srgbClr val="D56AA0"/>
+                    </a:gs>
+                  </a:gsLst>
+                  <a:lin ang="13500000" scaled="1"/>
+                  <a:tileRect/>
+                </a:gradFill>
+                <a:latin typeface="Nunito" panose="00000500000000000000" pitchFamily="2" charset="0"/>
+              </a:rPr>
+              <a:t>Business model</a:t>
+            </a:r>
+            <a:endParaRPr lang="en-GB" sz="8800" b="1" dirty="0">
+              <a:gradFill flip="none" rotWithShape="1">
+                <a:gsLst>
+                  <a:gs pos="100000">
+                    <a:srgbClr val="EA6984"/>
+                  </a:gs>
+                  <a:gs pos="0">
+                    <a:srgbClr val="D56AA0"/>
+                  </a:gs>
+                </a:gsLst>
+                <a:lin ang="13500000" scaled="1"/>
+                <a:tileRect/>
+              </a:gradFill>
+              <a:latin typeface="Nunito" panose="00000500000000000000" pitchFamily="2" charset="0"/>
+            </a:endParaRPr>
+          </a:p>
+        </p:txBody>
+      </p:sp>
+      <p:pic>
+        <p:nvPicPr>
+          <p:cNvPr id="25" name="Picture 24"/>
+          <p:cNvPicPr>
+            <a:picLocks noChangeAspect="1"/>
+          </p:cNvPicPr>
+          <p:nvPr/>
+        </p:nvPicPr>
+        <p:blipFill>
+          <a:blip r:embed="rId6" cstate="print">
+            <a:extLst>
+              <a:ext uri="{28A0092B-C50C-407E-A947-70E740481C1C}">
+                <a14:useLocalDpi xmlns:a14="http://schemas.microsoft.com/office/drawing/2010/main" val="0"/>
+              </a:ext>
+            </a:extLst>
+          </a:blip>
+          <a:stretch>
+            <a:fillRect/>
+          </a:stretch>
+        </p:blipFill>
+        <p:spPr>
+          <a:xfrm>
+            <a:off x="604184" y="2260600"/>
+            <a:ext cx="5465147" cy="4357296"/>
+          </a:xfrm>
+          <a:prstGeom prst="rect">
+            <a:avLst/>
+          </a:prstGeom>
+        </p:spPr>
+      </p:pic>
+    </p:spTree>
+    <p:extLst>
+      <p:ext uri="{BB962C8B-B14F-4D97-AF65-F5344CB8AC3E}">
+        <p14:creationId xmlns:p14="http://schemas.microsoft.com/office/powerpoint/2010/main" val="3557431691"/>
+      </p:ext>
+    </p:extLst>
+  </p:cSld>
+  <p:clrMapOvr>
+    <a:masterClrMapping/>
+  </p:clrMapOvr>
+  <mc:AlternateContent xmlns:mc="http://schemas.openxmlformats.org/markup-compatibility/2006" xmlns:p14="http://schemas.microsoft.com/office/powerpoint/2010/main">
+    <mc:Choice Requires="p14">
+      <p:transition p14:dur="0"/>
+    </mc:Choice>
+    <mc:Fallback xmlns="">
+      <p:transition/>
+    </mc:Fallback>
+  </mc:AlternateContent>
+  <p:timing>
+    <p:tnLst>
+      <p:par>
+        <p:cTn id="1" dur="indefinite" restart="never" nodeType="tmRoot"/>
+      </p:par>
+    </p:tnLst>
+  </p:timing>
+</p:sld>
+</file>
+
+<file path=ppt/slides/slide5.xml><?xml version="1.0" encoding="utf-8"?>
 <p:sld xmlns:a="http://schemas.openxmlformats.org/drawingml/2006/main" xmlns:r="http://schemas.openxmlformats.org/officeDocument/2006/relationships" xmlns:p="http://schemas.openxmlformats.org/presentationml/2006/main">
   <p:cSld>
     <p:bg>
@@ -5433,268 +5942,6 @@
     <p:extLst>
       <p:ext uri="{BB962C8B-B14F-4D97-AF65-F5344CB8AC3E}">
         <p14:creationId xmlns:p14="http://schemas.microsoft.com/office/powerpoint/2010/main" val="4036910040"/>
-      </p:ext>
-    </p:extLst>
-  </p:cSld>
-  <p:clrMapOvr>
-    <a:masterClrMapping/>
-  </p:clrMapOvr>
-  <mc:AlternateContent xmlns:mc="http://schemas.openxmlformats.org/markup-compatibility/2006" xmlns:p14="http://schemas.microsoft.com/office/powerpoint/2010/main">
-    <mc:Choice Requires="p14">
-      <p:transition p14:dur="0"/>
-    </mc:Choice>
-    <mc:Fallback xmlns="">
-      <p:transition/>
-    </mc:Fallback>
-  </mc:AlternateContent>
-  <p:timing>
-    <p:tnLst>
-      <p:par>
-        <p:cTn id="1" dur="indefinite" restart="never" nodeType="tmRoot"/>
-      </p:par>
-    </p:tnLst>
-  </p:timing>
-</p:sld>
-</file>
-
-<file path=ppt/slides/slide5.xml><?xml version="1.0" encoding="utf-8"?>
-<p:sld xmlns:a="http://schemas.openxmlformats.org/drawingml/2006/main" xmlns:r="http://schemas.openxmlformats.org/officeDocument/2006/relationships" xmlns:p="http://schemas.openxmlformats.org/presentationml/2006/main">
-  <p:cSld>
-    <p:bg>
-      <p:bgPr>
-        <a:solidFill>
-          <a:schemeClr val="bg1"/>
-        </a:solidFill>
-        <a:effectLst/>
-      </p:bgPr>
-    </p:bg>
-    <p:spTree>
-      <p:nvGrpSpPr>
-        <p:cNvPr id="1" name=""/>
-        <p:cNvGrpSpPr/>
-        <p:nvPr/>
-      </p:nvGrpSpPr>
-      <p:grpSpPr>
-        <a:xfrm>
-          <a:off x="0" y="0"/>
-          <a:ext cx="0" cy="0"/>
-          <a:chOff x="0" y="0"/>
-          <a:chExt cx="0" cy="0"/>
-        </a:xfrm>
-      </p:grpSpPr>
-      <p:sp>
-        <p:nvSpPr>
-          <p:cNvPr id="2" name="Title 1"/>
-          <p:cNvSpPr>
-            <a:spLocks noGrp="1"/>
-          </p:cNvSpPr>
-          <p:nvPr>
-            <p:ph type="ctrTitle"/>
-          </p:nvPr>
-        </p:nvSpPr>
-        <p:spPr>
-          <a:xfrm>
-            <a:off x="2318658" y="-653519"/>
-            <a:ext cx="9144000" cy="2387600"/>
-          </a:xfrm>
-        </p:spPr>
-        <p:txBody>
-          <a:bodyPr>
-            <a:normAutofit fontScale="90000"/>
-          </a:bodyPr>
-          <a:lstStyle/>
-          <a:p>
-            <a:pPr algn="r"/>
-            <a:r>
-              <a:rPr lang="en-GB" sz="8800" b="1" dirty="0" smtClean="0">
-                <a:gradFill flip="none" rotWithShape="1">
-                  <a:gsLst>
-                    <a:gs pos="100000">
-                      <a:srgbClr val="EA6984"/>
-                    </a:gs>
-                    <a:gs pos="0">
-                      <a:srgbClr val="D56AA0"/>
-                    </a:gs>
-                  </a:gsLst>
-                  <a:lin ang="13500000" scaled="1"/>
-                  <a:tileRect/>
-                </a:gradFill>
-                <a:latin typeface="Nunito" panose="00000500000000000000" pitchFamily="2" charset="0"/>
-              </a:rPr>
-              <a:t>How does it work?</a:t>
-            </a:r>
-            <a:endParaRPr lang="en-GB" sz="4000" b="1" dirty="0">
-              <a:gradFill flip="none" rotWithShape="1">
-                <a:gsLst>
-                  <a:gs pos="100000">
-                    <a:srgbClr val="EA6984"/>
-                  </a:gs>
-                  <a:gs pos="0">
-                    <a:srgbClr val="D56AA0"/>
-                  </a:gs>
-                </a:gsLst>
-                <a:lin ang="13500000" scaled="1"/>
-                <a:tileRect/>
-              </a:gradFill>
-              <a:latin typeface="Nunito" panose="00000500000000000000" pitchFamily="2" charset="0"/>
-            </a:endParaRPr>
-          </a:p>
-        </p:txBody>
-      </p:sp>
-      <p:pic>
-        <p:nvPicPr>
-          <p:cNvPr id="16" name="Picture 15"/>
-          <p:cNvPicPr>
-            <a:picLocks noChangeAspect="1"/>
-          </p:cNvPicPr>
-          <p:nvPr/>
-        </p:nvPicPr>
-        <p:blipFill>
-          <a:blip r:embed="rId2" cstate="print">
-            <a:extLst>
-              <a:ext uri="{28A0092B-C50C-407E-A947-70E740481C1C}">
-                <a14:useLocalDpi xmlns:a14="http://schemas.microsoft.com/office/drawing/2010/main" val="0"/>
-              </a:ext>
-            </a:extLst>
-          </a:blip>
-          <a:stretch>
-            <a:fillRect/>
-          </a:stretch>
-        </p:blipFill>
-        <p:spPr>
-          <a:xfrm rot="11346299">
-            <a:off x="8807491" y="2656255"/>
-            <a:ext cx="6769017" cy="6769017"/>
-          </a:xfrm>
-          <a:prstGeom prst="rect">
-            <a:avLst/>
-          </a:prstGeom>
-          <a:noFill/>
-          <a:ln>
-            <a:noFill/>
-          </a:ln>
-        </p:spPr>
-      </p:pic>
-      <p:grpSp>
-        <p:nvGrpSpPr>
-          <p:cNvPr id="10" name="Group 9"/>
-          <p:cNvGrpSpPr/>
-          <p:nvPr/>
-        </p:nvGrpSpPr>
-        <p:grpSpPr>
-          <a:xfrm>
-            <a:off x="-2982265" y="-4038029"/>
-            <a:ext cx="6769017" cy="6769017"/>
-            <a:chOff x="-2982265" y="-4038029"/>
-            <a:chExt cx="6769017" cy="6769017"/>
-          </a:xfrm>
-        </p:grpSpPr>
-        <p:pic>
-          <p:nvPicPr>
-            <p:cNvPr id="17" name="Picture 16"/>
-            <p:cNvPicPr>
-              <a:picLocks noChangeAspect="1"/>
-            </p:cNvPicPr>
-            <p:nvPr/>
-          </p:nvPicPr>
-          <p:blipFill>
-            <a:blip r:embed="rId3" cstate="print">
-              <a:extLst>
-                <a:ext uri="{BEBA8EAE-BF5A-486C-A8C5-ECC9F3942E4B}">
-                  <a14:imgProps xmlns:a14="http://schemas.microsoft.com/office/drawing/2010/main">
-                    <a14:imgLayer r:embed="rId4">
-                      <a14:imgEffect>
-                        <a14:colorTemperature colorTemp="11200"/>
-                      </a14:imgEffect>
-                    </a14:imgLayer>
-                  </a14:imgProps>
-                </a:ext>
-                <a:ext uri="{28A0092B-C50C-407E-A947-70E740481C1C}">
-                  <a14:useLocalDpi xmlns:a14="http://schemas.microsoft.com/office/drawing/2010/main" val="0"/>
-                </a:ext>
-              </a:extLst>
-            </a:blip>
-            <a:stretch>
-              <a:fillRect/>
-            </a:stretch>
-          </p:blipFill>
-          <p:spPr>
-            <a:xfrm rot="8119872">
-              <a:off x="-2982265" y="-4038029"/>
-              <a:ext cx="6769017" cy="6769017"/>
-            </a:xfrm>
-            <a:prstGeom prst="rect">
-              <a:avLst/>
-            </a:prstGeom>
-            <a:ln>
-              <a:noFill/>
-            </a:ln>
-          </p:spPr>
-        </p:pic>
-        <p:pic>
-          <p:nvPicPr>
-            <p:cNvPr id="18" name="Picture 17"/>
-            <p:cNvPicPr>
-              <a:picLocks noChangeAspect="1"/>
-            </p:cNvPicPr>
-            <p:nvPr/>
-          </p:nvPicPr>
-          <p:blipFill>
-            <a:blip r:embed="rId5" cstate="print">
-              <a:extLst>
-                <a:ext uri="{28A0092B-C50C-407E-A947-70E740481C1C}">
-                  <a14:useLocalDpi xmlns:a14="http://schemas.microsoft.com/office/drawing/2010/main" val="0"/>
-                </a:ext>
-              </a:extLst>
-            </a:blip>
-            <a:stretch>
-              <a:fillRect/>
-            </a:stretch>
-          </p:blipFill>
-          <p:spPr>
-            <a:xfrm>
-              <a:off x="-1377" y="178861"/>
-              <a:ext cx="1793583" cy="1793583"/>
-            </a:xfrm>
-            <a:prstGeom prst="rect">
-              <a:avLst/>
-            </a:prstGeom>
-            <a:ln>
-              <a:noFill/>
-            </a:ln>
-          </p:spPr>
-        </p:pic>
-      </p:grpSp>
-      <p:sp>
-        <p:nvSpPr>
-          <p:cNvPr id="8" name="TextBox 7"/>
-          <p:cNvSpPr txBox="1"/>
-          <p:nvPr/>
-        </p:nvSpPr>
-        <p:spPr>
-          <a:xfrm>
-            <a:off x="1019175" y="3350020"/>
-            <a:ext cx="1009650" cy="688580"/>
-          </a:xfrm>
-          <a:prstGeom prst="rect">
-            <a:avLst/>
-          </a:prstGeom>
-          <a:noFill/>
-        </p:spPr>
-        <p:txBody>
-          <a:bodyPr wrap="square" rtlCol="0">
-            <a:spAutoFit/>
-          </a:bodyPr>
-          <a:lstStyle/>
-          <a:p>
-            <a:endParaRPr lang="en-GB" dirty="0"/>
-          </a:p>
-        </p:txBody>
-      </p:sp>
-    </p:spTree>
-    <p:extLst>
-      <p:ext uri="{BB962C8B-B14F-4D97-AF65-F5344CB8AC3E}">
-        <p14:creationId xmlns:p14="http://schemas.microsoft.com/office/powerpoint/2010/main" val="3557431691"/>
       </p:ext>
     </p:extLst>
   </p:cSld>

</xml_diff>